<commit_message>
started the admin fix
</commit_message>
<xml_diff>
--- a/Presentation.pptx
+++ b/Presentation.pptx
@@ -5579,8 +5579,16 @@
           </a:p>
           <a:p>
             <a:r>
-              <a:rPr lang="en-US" dirty="0"/>
-              <a:t>View part orders. </a:t>
+              <a:rPr lang="en-US"/>
+              <a:t>View </a:t>
+            </a:r>
+            <a:r>
+              <a:rPr lang="en-US" smtClean="0"/>
+              <a:t>past </a:t>
+            </a:r>
+            <a:r>
+              <a:rPr lang="en-US" dirty="0"/>
+              <a:t>orders. </a:t>
             </a:r>
           </a:p>
           <a:p>
@@ -5825,7 +5833,6 @@
               <a:rPr lang="en-US" dirty="0"/>
               <a:t>in browser. </a:t>
             </a:r>
-            <a:endParaRPr lang="en-US" dirty="0"/>
           </a:p>
           <a:p>
             <a:endParaRPr lang="en-US" dirty="0"/>
@@ -6323,7 +6330,6 @@
               <a:rPr lang="en-US" dirty="0"/>
               <a:t>Go to home page. </a:t>
             </a:r>
-            <a:endParaRPr lang="en-US" dirty="0"/>
           </a:p>
           <a:p>
             <a:r>

</xml_diff>